<commit_message>
Updating each PPT Data
- Implemented a reflection system
  when colliding with a wall

- Delete resource data
</commit_message>
<xml_diff>
--- a/Assets/Class/NavMesh Agent/PPT Data/NavMesh Agent Example.pptx
+++ b/Assets/Class/NavMesh Agent/PPT Data/NavMesh Agent Example.pptx
@@ -2,7 +2,7 @@
 <file path=ppt/presentation.xml><?xml version="1.0" encoding="utf-8"?>
 <p:presentation xmlns:a="http://schemas.openxmlformats.org/drawingml/2006/main" xmlns:r="http://schemas.openxmlformats.org/officeDocument/2006/relationships" xmlns:p="http://schemas.openxmlformats.org/presentationml/2006/main" xmlns:p14="http://schemas.microsoft.com/office/powerpoint/2010/main" saveSubsetFonts="1" firstSlideNum="0">
   <p:sldMasterIdLst>
-    <p:sldMasterId id="2147486188" r:id="rId12"/>
+    <p:sldMasterId id="2147486190" r:id="rId12"/>
   </p:sldMasterIdLst>
   <p:notesMasterIdLst>
     <p:notesMasterId r:id="rId14"/>
@@ -12,17 +12,17 @@
     <p:sldId id="309" r:id="rId18"/>
     <p:sldId id="310" r:id="rId20"/>
     <p:sldId id="300" r:id="rId22"/>
-    <p:sldId id="299" r:id="rId23"/>
-    <p:sldId id="301" r:id="rId25"/>
-    <p:sldId id="303" r:id="rId27"/>
-    <p:sldId id="302" r:id="rId29"/>
-    <p:sldId id="298" r:id="rId31"/>
-    <p:sldId id="304" r:id="rId33"/>
-    <p:sldId id="305" r:id="rId34"/>
-    <p:sldId id="306" r:id="rId36"/>
-    <p:sldId id="311" r:id="rId38"/>
-    <p:sldId id="307" r:id="rId40"/>
-    <p:sldId id="308" r:id="rId42"/>
+    <p:sldId id="299" r:id="rId24"/>
+    <p:sldId id="301" r:id="rId26"/>
+    <p:sldId id="303" r:id="rId28"/>
+    <p:sldId id="302" r:id="rId30"/>
+    <p:sldId id="298" r:id="rId32"/>
+    <p:sldId id="304" r:id="rId34"/>
+    <p:sldId id="305" r:id="rId35"/>
+    <p:sldId id="306" r:id="rId37"/>
+    <p:sldId id="311" r:id="rId39"/>
+    <p:sldId id="307" r:id="rId41"/>
+    <p:sldId id="308" r:id="rId43"/>
   </p:sldIdLst>
   <p:sldSz cx="12192000" cy="6858000"/>
   <p:notesSz cx="6858000" cy="9144000"/>
@@ -8359,7 +8359,7 @@
       </p:sp>
       <p:pic>
         <p:nvPicPr>
-          <p:cNvPr id="1041" name="그림 126"/>
+          <p:cNvPr id="1041" name="그림 126" descr="C:/Users/Admin1/AppData/Roaming/PolarisOffice/ETemp/2556_16958208/fImage402163385436.png"/>
           <p:cNvPicPr>
             <a:picLocks noChangeAspect="1"/>
           </p:cNvPicPr>
@@ -8379,8 +8379,8 @@
         </p:blipFill>
         <p:spPr>
           <a:xfrm rot="0">
-            <a:off x="1247140" y="2501900"/>
-            <a:ext cx="4140200" cy="2599055"/>
+            <a:off x="1247140" y="2518410"/>
+            <a:ext cx="4140835" cy="2599690"/>
           </a:xfrm>
           <a:prstGeom prst="roundRect"/>
           <a:solidFill>
@@ -10484,7 +10484,7 @@
       </p:sp>
       <p:pic>
         <p:nvPicPr>
-          <p:cNvPr id="1221" name="그림 180" descr="C:/Users/Admin1/AppData/Roaming/PolarisOffice/ETemp/8136_15119280/fImage175004216299.png"/>
+          <p:cNvPr id="1221" name="그림 180" descr="C:/Users/Admin1/AppData/Roaming/PolarisOffice/ETemp/2556_16958208/fImage175004216299.png"/>
           <p:cNvPicPr>
             <a:picLocks noChangeAspect="1"/>
           </p:cNvPicPr>
@@ -10504,8 +10504,8 @@
         </p:blipFill>
         <p:spPr>
           <a:xfrm rot="0">
-            <a:off x="1352550" y="2755900"/>
-            <a:ext cx="4039235" cy="3186430"/>
+            <a:off x="1247140" y="2581275"/>
+            <a:ext cx="4140200" cy="2149475"/>
           </a:xfrm>
           <a:prstGeom prst="roundRect"/>
           <a:solidFill>
@@ -10523,8 +10523,8 @@
         </p:nvSpPr>
         <p:spPr>
           <a:xfrm rot="0">
-            <a:off x="1247775" y="1419225"/>
-            <a:ext cx="4144010" cy="1200785"/>
+            <a:off x="1247775" y="1477010"/>
+            <a:ext cx="4144645" cy="923925"/>
           </a:xfrm>
           <a:prstGeom prst="rect"/>
           <a:noFill/>
@@ -10548,32 +10548,53 @@
                 <a:latin typeface="맑은 고딕" charset="0"/>
                 <a:ea typeface="맑은 고딕" charset="0"/>
               </a:rPr>
-              <a:t>Off Mesh Link란?</a:t>
+              <a:t>오프 메쉬 링크는 </a:t>
+            </a:r>
+            <a:r>
+              <a:rPr lang="ko-KR" sz="1800">
+                <a:latin typeface="맑은 고딕" charset="0"/>
+                <a:ea typeface="맑은 고딕" charset="0"/>
+              </a:rPr>
+              <a:t>내비게이션 경로가 끊어진 영역을 이동할 수 있도록 설정하는 컴포넌트입니다. </a:t>
             </a:r>
             <a:endParaRPr lang="ko-KR" altLang="en-US" sz="1800">
               <a:latin typeface="맑은 고딕" charset="0"/>
               <a:ea typeface="맑은 고딕" charset="0"/>
             </a:endParaRPr>
           </a:p>
-          <a:p>
-            <a:pPr marL="0" indent="0" rtl="0" algn="l" defTabSz="914400" eaLnBrk="1" latinLnBrk="0" hangingPunct="1">
-              <a:buFontTx/>
-              <a:buNone/>
-            </a:pPr>
-            <a:r>
-              <a:rPr lang="ko-KR" sz="1800">
-                <a:latin typeface="맑은 고딕" charset="0"/>
-                <a:ea typeface="맑은 고딕" charset="0"/>
-              </a:rPr>
-              <a:t>내비게이션 경로가 끊어진 영역을 이동할 수 있도록 설정하는 컴포넌트입니다. </a:t>
-            </a:r>
-            <a:endParaRPr lang="ko-KR" altLang="en-US" sz="1800">
-              <a:latin typeface="맑은 고딕" charset="0"/>
-              <a:ea typeface="맑은 고딕" charset="0"/>
-            </a:endParaRPr>
-          </a:p>
-        </p:txBody>
-      </p:sp>
+        </p:txBody>
+      </p:sp>
+      <p:pic>
+        <p:nvPicPr>
+          <p:cNvPr id="1223" name="그림 1" descr="C:/Users/Admin1/AppData/Roaming/PolarisOffice/ETemp/2556_16958208/fImage420221441.png"/>
+          <p:cNvPicPr>
+            <a:picLocks noChangeAspect="1"/>
+          </p:cNvPicPr>
+          <p:nvPr/>
+        </p:nvPicPr>
+        <p:blipFill rotWithShape="1">
+          <a:blip r:embed="rId7" cstate="print">
+            <a:extLst>
+              <a:ext uri="{28A0092B-C50C-407E-A947-70E740481C1C}">
+                <a14:useLocalDpi xmlns:a14="http://schemas.microsoft.com/office/drawing/2010/main" val="0"/>
+              </a:ext>
+            </a:extLst>
+          </a:blip>
+          <a:stretch>
+            <a:fillRect/>
+          </a:stretch>
+        </p:blipFill>
+        <p:spPr>
+          <a:xfrm rot="0">
+            <a:off x="6816725" y="2582545"/>
+            <a:ext cx="4140200" cy="1266825"/>
+          </a:xfrm>
+          <a:prstGeom prst="roundRect"/>
+          <a:solidFill>
+            <a:srgbClr val="EDEDED"/>
+          </a:solidFill>
+        </p:spPr>
+      </p:pic>
     </p:spTree>
   </p:cSld>
   <p:clrMapOvr>

</xml_diff>

<commit_message>
Photon Server Tutorial Renewal
- When creating a photon game
  object, if the size of the
  circumference of the circle is
  obtained, the object can be
  created at the end point of the
  circle.

- Resizing the Dashboard Prefab

- Delete and add resource data
</commit_message>
<xml_diff>
--- a/Assets/Class/NavMesh Agent/PPT Data/NavMesh Agent Example.pptx
+++ b/Assets/Class/NavMesh Agent/PPT Data/NavMesh Agent Example.pptx
@@ -2,30 +2,30 @@
 <file path=ppt/presentation.xml><?xml version="1.0" encoding="utf-8"?>
 <p:presentation xmlns:a="http://schemas.openxmlformats.org/drawingml/2006/main" xmlns:r="http://schemas.openxmlformats.org/officeDocument/2006/relationships" xmlns:p="http://schemas.openxmlformats.org/presentationml/2006/main" xmlns:p14="http://schemas.microsoft.com/office/powerpoint/2010/main" saveSubsetFonts="1" firstSlideNum="0">
   <p:sldMasterIdLst>
-    <p:sldMasterId id="2147486315" r:id="rId12"/>
+    <p:sldMasterId id="2147486317" r:id="rId12"/>
   </p:sldMasterIdLst>
   <p:notesMasterIdLst>
     <p:notesMasterId r:id="rId14"/>
   </p:notesMasterIdLst>
   <p:sldIdLst>
     <p:sldId id="287" r:id="rId16"/>
-    <p:sldId id="309" r:id="rId17"/>
-    <p:sldId id="310" r:id="rId18"/>
-    <p:sldId id="300" r:id="rId19"/>
-    <p:sldId id="299" r:id="rId20"/>
-    <p:sldId id="301" r:id="rId21"/>
-    <p:sldId id="303" r:id="rId22"/>
-    <p:sldId id="302" r:id="rId23"/>
-    <p:sldId id="298" r:id="rId24"/>
-    <p:sldId id="304" r:id="rId25"/>
-    <p:sldId id="305" r:id="rId26"/>
-    <p:sldId id="306" r:id="rId27"/>
-    <p:sldId id="312" r:id="rId28"/>
-    <p:sldId id="307" r:id="rId29"/>
-    <p:sldId id="313" r:id="rId30"/>
-    <p:sldId id="314" r:id="rId31"/>
-    <p:sldId id="315" r:id="rId32"/>
-    <p:sldId id="311" r:id="rId33"/>
+    <p:sldId id="309" r:id="rId18"/>
+    <p:sldId id="310" r:id="rId20"/>
+    <p:sldId id="300" r:id="rId22"/>
+    <p:sldId id="299" r:id="rId24"/>
+    <p:sldId id="301" r:id="rId26"/>
+    <p:sldId id="303" r:id="rId28"/>
+    <p:sldId id="302" r:id="rId30"/>
+    <p:sldId id="298" r:id="rId32"/>
+    <p:sldId id="304" r:id="rId34"/>
+    <p:sldId id="305" r:id="rId36"/>
+    <p:sldId id="306" r:id="rId38"/>
+    <p:sldId id="312" r:id="rId40"/>
+    <p:sldId id="307" r:id="rId42"/>
+    <p:sldId id="313" r:id="rId44"/>
+    <p:sldId id="314" r:id="rId46"/>
+    <p:sldId id="315" r:id="rId48"/>
+    <p:sldId id="311" r:id="rId50"/>
   </p:sldIdLst>
   <p:sldSz cx="12192000" cy="6858000"/>
   <p:notesSz cx="6858000" cy="9144000"/>
@@ -12673,8 +12673,8 @@
         </p:nvSpPr>
         <p:spPr>
           <a:xfrm rot="0">
-            <a:off x="6815455" y="5303520"/>
-            <a:ext cx="4140835" cy="647065"/>
+            <a:off x="6815455" y="5407660"/>
+            <a:ext cx="4141470" cy="647700"/>
           </a:xfrm>
           <a:prstGeom prst="rect"/>
           <a:noFill/>
@@ -12742,14 +12742,7 @@
                 <a:latin typeface="맑은 고딕" charset="0"/>
                 <a:ea typeface="맑은 고딕" charset="0"/>
               </a:rPr>
-              <a:t> Agent</a:t>
-            </a:r>
-            <a:r>
-              <a:rPr sz="1800">
-                <a:latin typeface="맑은 고딕" charset="0"/>
-                <a:ea typeface="맑은 고딕" charset="0"/>
-              </a:rPr>
-              <a:t> </a:t>
+              <a:t> Agent </a:t>
             </a:r>
             <a:r>
               <a:rPr lang="ko-KR" sz="1800">
@@ -12774,17 +12767,17 @@
       </p:sp>
       <p:pic>
         <p:nvPicPr>
-          <p:cNvPr id="1215" name="그림 54" descr="C:/Users/Admin1/AppData/Roaming/PolarisOffice/ETemp/20768_20502728/fImage209703666827.png"/>
+          <p:cNvPr id="1215" name="그림 54" descr="C:/Users/Admin1/AppData/Roaming/PolarisOffice/ETemp/17932_7196128/fImage209703666827.png"/>
           <p:cNvPicPr>
             <a:picLocks noChangeAspect="1"/>
           </p:cNvPicPr>
           <p:nvPr/>
         </p:nvPicPr>
         <p:blipFill rotWithShape="1">
-          <a:blip r:embed="rId8" cstate="print">
+          <a:blip r:embed="rId8" cstate="hqprint">
             <a:extLst>
               <a:ext uri="{28A0092B-C50C-407E-A947-70E740481C1C}">
-                <a14:useLocalDpi xmlns:a14="http://schemas.microsoft.com/office/drawing/2010/main" val="0"/>
+                <a14:useLocalDpi xmlns:a14="http://schemas.microsoft.com/office/drawing/2010/main"/>
               </a:ext>
             </a:extLst>
           </a:blip>
@@ -12795,7 +12788,7 @@
         <p:spPr>
           <a:xfrm rot="0">
             <a:off x="6817360" y="1454785"/>
-            <a:ext cx="4148455" cy="3674745"/>
+            <a:ext cx="4149090" cy="3793490"/>
           </a:xfrm>
           <a:prstGeom prst="roundRect"/>
           <a:solidFill>
@@ -12805,7 +12798,7 @@
       </p:pic>
       <p:pic>
         <p:nvPicPr>
-          <p:cNvPr id="1216" name="그림 57" descr="C:/Users/Admin1/AppData/Roaming/PolarisOffice/ETemp/20768_20502728/fImage187953679961.png"/>
+          <p:cNvPr id="1216" name="그림 57"/>
           <p:cNvPicPr>
             <a:picLocks noChangeAspect="1"/>
           </p:cNvPicPr>
@@ -12836,7 +12829,7 @@
       </p:pic>
       <p:pic>
         <p:nvPicPr>
-          <p:cNvPr id="1217" name="그림 60" descr="C:/Users/Admin1/AppData/Roaming/PolarisOffice/ETemp/20768_20502728/fImage10774368491.png"/>
+          <p:cNvPr id="1217" name="그림 60"/>
           <p:cNvPicPr>
             <a:picLocks noChangeAspect="1"/>
           </p:cNvPicPr>
@@ -12909,7 +12902,7 @@
         <p:spPr>
           <a:xfrm rot="0">
             <a:off x="1226185" y="2956560"/>
-            <a:ext cx="4152900" cy="923925"/>
+            <a:ext cx="4153535" cy="924560"/>
           </a:xfrm>
           <a:prstGeom prst="rect"/>
           <a:noFill/>
@@ -12963,14 +12956,7 @@
                 <a:latin typeface="맑은 고딕" charset="0"/>
                 <a:ea typeface="맑은 고딕" charset="0"/>
               </a:rPr>
-              <a:t> </a:t>
-            </a:r>
-            <a:r>
-              <a:rPr sz="1800">
-                <a:latin typeface="맑은 고딕" charset="0"/>
-                <a:ea typeface="맑은 고딕" charset="0"/>
-              </a:rPr>
-              <a:t>이</a:t>
+              <a:t> 이</a:t>
             </a:r>
             <a:r>
               <a:rPr lang="ko-KR" sz="1800">
@@ -13000,6 +12986,139 @@
           </a:p>
         </p:txBody>
       </p:sp>
+      <p:sp>
+        <p:nvSpPr>
+          <p:cNvPr id="1221" name="텍스트 상자 6"/>
+          <p:cNvSpPr txBox="1">
+            <a:spLocks/>
+          </p:cNvSpPr>
+          <p:nvPr/>
+        </p:nvSpPr>
+        <p:spPr>
+          <a:xfrm rot="0">
+            <a:off x="1223645" y="5400040"/>
+            <a:ext cx="4154805" cy="647065"/>
+          </a:xfrm>
+          <a:prstGeom prst="rect"/>
+          <a:noFill/>
+          <a:ln w="0">
+            <a:noFill/>
+            <a:prstDash/>
+          </a:ln>
+        </p:spPr>
+        <p:txBody>
+          <a:bodyPr wrap="square" lIns="89535" tIns="46355" rIns="89535" bIns="46355" numCol="1" vert="horz" anchor="t">
+            <a:spAutoFit/>
+          </a:bodyPr>
+          <a:lstStyle/>
+          <a:p>
+            <a:pPr marL="0" indent="0" rtl="0" algn="l" defTabSz="914400" eaLnBrk="1" latinLnBrk="0" hangingPunct="1">
+              <a:buFontTx/>
+              <a:buNone/>
+            </a:pPr>
+            <a:r>
+              <a:rPr sz="1800" b="1">
+                <a:solidFill>
+                  <a:srgbClr val="0611F2"/>
+                </a:solidFill>
+                <a:latin typeface="맑은 고딕" charset="0"/>
+                <a:ea typeface="맑은 고딕" charset="0"/>
+              </a:rPr>
+              <a:t>4</a:t>
+            </a:r>
+            <a:r>
+              <a:rPr lang="ko-KR" sz="1800" b="1">
+                <a:solidFill>
+                  <a:srgbClr val="0611F2"/>
+                </a:solidFill>
+                <a:latin typeface="맑은 고딕" charset="0"/>
+                <a:ea typeface="맑은 고딕" charset="0"/>
+              </a:rPr>
+              <a:t>3</a:t>
+            </a:r>
+            <a:r>
+              <a:rPr sz="1800" b="1">
+                <a:solidFill>
+                  <a:srgbClr val="0611F2"/>
+                </a:solidFill>
+                <a:latin typeface="맑은 고딕" charset="0"/>
+                <a:ea typeface="맑은 고딕" charset="0"/>
+              </a:rPr>
+              <a:t>.</a:t>
+            </a:r>
+            <a:r>
+              <a:rPr sz="1800">
+                <a:latin typeface="맑은 고딕" charset="0"/>
+                <a:ea typeface="맑은 고딕" charset="0"/>
+              </a:rPr>
+              <a:t> </a:t>
+            </a:r>
+            <a:r>
+              <a:rPr sz="1800">
+                <a:latin typeface="맑은 고딕" charset="0"/>
+                <a:ea typeface="맑은 고딕" charset="0"/>
+              </a:rPr>
+              <a:t>그</a:t>
+            </a:r>
+            <a:r>
+              <a:rPr lang="ko-KR" sz="1800">
+                <a:latin typeface="맑은 고딕" charset="0"/>
+                <a:ea typeface="맑은 고딕" charset="0"/>
+              </a:rPr>
+              <a:t>런 다음</a:t>
+            </a:r>
+            <a:r>
+              <a:rPr sz="1800">
+                <a:latin typeface="맑은 고딕" charset="0"/>
+                <a:ea typeface="맑은 고딕" charset="0"/>
+              </a:rPr>
+              <a:t> </a:t>
+            </a:r>
+            <a:r>
+              <a:rPr lang="ko-KR" sz="1800">
+                <a:latin typeface="맑은 고딕" charset="0"/>
+                <a:ea typeface="맑은 고딕" charset="0"/>
+              </a:rPr>
+              <a:t>Navigation의 Agents를 선택하고 Max Slope 값을 설정합니다.</a:t>
+            </a:r>
+            <a:endParaRPr lang="ko-KR" altLang="en-US" sz="1800">
+              <a:latin typeface="맑은 고딕" charset="0"/>
+              <a:ea typeface="맑은 고딕" charset="0"/>
+            </a:endParaRPr>
+          </a:p>
+        </p:txBody>
+      </p:sp>
+      <p:pic>
+        <p:nvPicPr>
+          <p:cNvPr id="1222" name="그림 7" descr="C:/Users/Admin1/AppData/Roaming/PolarisOffice/ETemp/17932_7196128/fImage706628241.png"/>
+          <p:cNvPicPr>
+            <a:picLocks noChangeAspect="1"/>
+          </p:cNvPicPr>
+          <p:nvPr/>
+        </p:nvPicPr>
+        <p:blipFill rotWithShape="1">
+          <a:blip r:embed="rId11" cstate="print">
+            <a:extLst>
+              <a:ext uri="{28A0092B-C50C-407E-A947-70E740481C1C}">
+                <a14:useLocalDpi xmlns:a14="http://schemas.microsoft.com/office/drawing/2010/main" val="0"/>
+              </a:ext>
+            </a:extLst>
+          </a:blip>
+          <a:stretch>
+            <a:fillRect/>
+          </a:stretch>
+        </p:blipFill>
+        <p:spPr>
+          <a:xfrm rot="0">
+            <a:off x="1221105" y="4003675"/>
+            <a:ext cx="4139565" cy="1270635"/>
+          </a:xfrm>
+          <a:prstGeom prst="roundRect"/>
+          <a:solidFill>
+            <a:srgbClr val="EDEDED"/>
+          </a:solidFill>
+        </p:spPr>
+      </p:pic>
     </p:spTree>
   </p:cSld>
   <p:clrMapOvr>

</xml_diff>